<commit_message>
Finished the contingent exercise.
</commit_message>
<xml_diff>
--- a/exercises/cisc-813/ppos/slides.pptx
+++ b/exercises/cisc-813/ppos/slides.pptx
@@ -693,7 +693,7 @@
           <a:p>
             <a:fld id="{D6D0F569-AC90-44EB-9EF4-4E5C2F5D823C}" type="datetime1">
               <a:rPr lang="en-US" smtClean="0"/>
-              <a:t>2/22/2023</a:t>
+              <a:t>2/23/2023</a:t>
             </a:fld>
             <a:endParaRPr lang="en-US" dirty="0"/>
           </a:p>
@@ -1372,7 +1372,7 @@
           <a:p>
             <a:fld id="{46BA7D41-E8B7-4A0B-B861-3EC4AE88917D}" type="datetime1">
               <a:rPr lang="en-US" smtClean="0"/>
-              <a:t>2/22/2023</a:t>
+              <a:t>2/23/2023</a:t>
             </a:fld>
             <a:endParaRPr lang="en-US" dirty="0"/>
           </a:p>
@@ -2061,7 +2061,7 @@
           <a:p>
             <a:fld id="{A7C34823-0B19-4B4E-A643-7A3B0A3D24D6}" type="datetime1">
               <a:rPr lang="en-US" smtClean="0"/>
-              <a:t>2/22/2023</a:t>
+              <a:t>2/23/2023</a:t>
             </a:fld>
             <a:endParaRPr lang="en-US" dirty="0"/>
           </a:p>
@@ -3184,7 +3184,7 @@
           <a:p>
             <a:fld id="{8C2D79EF-17C8-45D8-9866-DAF5723FC604}" type="datetime1">
               <a:rPr lang="en-US" smtClean="0"/>
-              <a:t>2/22/2023</a:t>
+              <a:t>2/23/2023</a:t>
             </a:fld>
             <a:endParaRPr lang="en-US" dirty="0"/>
           </a:p>
@@ -3939,7 +3939,7 @@
           <a:p>
             <a:fld id="{DFFC2ADC-3680-4013-A757-E4663495DB98}" type="datetime1">
               <a:rPr lang="en-US" smtClean="0"/>
-              <a:t>2/22/2023</a:t>
+              <a:t>2/23/2023</a:t>
             </a:fld>
             <a:endParaRPr lang="en-US" dirty="0"/>
           </a:p>
@@ -4686,7 +4686,7 @@
           <a:p>
             <a:fld id="{4751BA94-5DCA-4F19-960F-0FB2BD5EE85A}" type="datetime1">
               <a:rPr lang="en-US" smtClean="0"/>
-              <a:t>2/22/2023</a:t>
+              <a:t>2/23/2023</a:t>
             </a:fld>
             <a:endParaRPr lang="en-US" dirty="0"/>
           </a:p>
@@ -5580,7 +5580,7 @@
           <a:p>
             <a:fld id="{01BED947-38D9-44AC-8B89-E79758333B77}" type="datetime1">
               <a:rPr lang="en-US" smtClean="0"/>
-              <a:t>2/22/2023</a:t>
+              <a:t>2/23/2023</a:t>
             </a:fld>
             <a:endParaRPr lang="en-US" dirty="0"/>
           </a:p>
@@ -6201,7 +6201,7 @@
           <a:p>
             <a:fld id="{3781E23F-BD3C-4F23-B116-2B758120C8AC}" type="datetime1">
               <a:rPr lang="en-US" smtClean="0"/>
-              <a:t>2/22/2023</a:t>
+              <a:t>2/23/2023</a:t>
             </a:fld>
             <a:endParaRPr lang="en-US" dirty="0"/>
           </a:p>
@@ -6793,7 +6793,7 @@
           <a:p>
             <a:fld id="{473CFAA9-6D59-4D98-869E-ACBDB83B2CA4}" type="datetime1">
               <a:rPr lang="en-US" smtClean="0"/>
-              <a:t>2/22/2023</a:t>
+              <a:t>2/23/2023</a:t>
             </a:fld>
             <a:endParaRPr lang="en-US"/>
           </a:p>
@@ -7585,7 +7585,7 @@
           <a:p>
             <a:fld id="{DC410804-27E3-430A-BB42-B831260DE39A}" type="datetime1">
               <a:rPr lang="en-US" smtClean="0"/>
-              <a:t>2/22/2023</a:t>
+              <a:t>2/23/2023</a:t>
             </a:fld>
             <a:endParaRPr lang="en-US" dirty="0"/>
           </a:p>
@@ -8356,7 +8356,7 @@
           <a:p>
             <a:fld id="{60E22DE3-3D1A-4D53-B9A6-6C7463B8C992}" type="datetime1">
               <a:rPr lang="en-US" smtClean="0"/>
-              <a:t>2/22/2023</a:t>
+              <a:t>2/23/2023</a:t>
             </a:fld>
             <a:endParaRPr lang="en-US" dirty="0"/>
           </a:p>
@@ -8667,7 +8667,7 @@
             <a:fld id="{5ECD8B30-1B71-45A1-8314-D59C86F581E1}" type="datetime1">
               <a:rPr lang="en-US" smtClean="0"/>
               <a:pPr/>
-              <a:t>2/22/2023</a:t>
+              <a:t>2/23/2023</a:t>
             </a:fld>
             <a:endParaRPr lang="en-US" b="1" dirty="0"/>
           </a:p>
@@ -9262,7 +9262,7 @@
           <a:p>
             <a:r>
               <a:rPr lang="en-CA" dirty="0"/>
-              <a:t>Add a </a:t>
+              <a:t>Modify the </a:t>
             </a:r>
             <a:r>
               <a:rPr lang="en-CA" b="1" dirty="0">
@@ -9274,14 +9274,14 @@
             </a:r>
             <a:r>
               <a:rPr lang="en-CA" dirty="0"/>
-              <a:t> action that lets them move instantly anywhere</a:t>
+              <a:t> action so that…</a:t>
             </a:r>
           </a:p>
           <a:p>
             <a:pPr lvl="1"/>
             <a:r>
               <a:rPr lang="en-CA" dirty="0"/>
-              <a:t>Use the </a:t>
+              <a:t>It uses a </a:t>
             </a:r>
             <a:r>
               <a:rPr lang="en-CA" b="1" dirty="0">
@@ -12394,6 +12394,24 @@
             </a:r>
           </a:p>
           <a:p>
+            <a:r>
+              <a:rPr lang="en-CA" dirty="0"/>
+              <a:t>Add a </a:t>
+            </a:r>
+            <a:r>
+              <a:rPr lang="en-CA" b="1" dirty="0">
+                <a:solidFill>
+                  <a:schemeClr val="accent4"/>
+                </a:solidFill>
+              </a:rPr>
+              <a:t>teleport</a:t>
+            </a:r>
+            <a:r>
+              <a:rPr lang="en-CA" dirty="0"/>
+              <a:t> action that lets them move instantly anywhere</a:t>
+            </a:r>
+          </a:p>
+          <a:p>
             <a:endParaRPr lang="en-CA" dirty="0"/>
           </a:p>
           <a:p>

</xml_diff>